<commit_message>
Updates the continued development of Theory of Operation document taking into account additional class documentation for signals.
</commit_message>
<xml_diff>
--- a/setup flowchart.pptx
+++ b/setup flowchart.pptx
@@ -104,7 +104,393 @@
       </a:defRPr>
     </a:lvl9pPr>
   </p:defaultTextStyle>
+  <p:extLst>
+    <p:ext uri="{EFAFB233-063F-42B5-8137-9DF3F51BA10A}">
+      <p15:sldGuideLst xmlns:p15="http://schemas.microsoft.com/office/powerpoint/2012/main"/>
+    </p:ext>
+  </p:extLst>
 </p:presentation>
+</file>
+
+<file path=ppt/revisionInfo.xml><?xml version="1.0" encoding="utf-8"?>
+<p1510:revInfo xmlns:a="http://schemas.openxmlformats.org/drawingml/2006/main" xmlns:r="http://schemas.openxmlformats.org/officeDocument/2006/relationships" xmlns:p1510="http://schemas.microsoft.com/office/powerpoint/2015/10/main">
+  <p1510:revLst>
+    <p1510:client id="{E00440B9-FF97-4521-B91E-3FE0BC6BFA0A}" v="4" dt="2024-10-09T02:18:43.777"/>
+  </p1510:revLst>
+</p1510:revInfo>
+</file>
+
+<file path=ppt/changesInfos/changesInfo1.xml><?xml version="1.0" encoding="utf-8"?>
+<pc:chgInfo xmlns:a="http://schemas.openxmlformats.org/drawingml/2006/main" xmlns:r="http://schemas.openxmlformats.org/officeDocument/2006/relationships" xmlns:ac="http://schemas.microsoft.com/office/drawing/2013/main/command" xmlns:pc="http://schemas.microsoft.com/office/powerpoint/2013/main/command">
+  <pc:docChgLst>
+    <pc:chgData name="Ronald Lehmer" userId="60fab73a6ba11986" providerId="LiveId" clId="{E00440B9-FF97-4521-B91E-3FE0BC6BFA0A}"/>
+    <pc:docChg chg="modSld">
+      <pc:chgData name="Ronald Lehmer" userId="60fab73a6ba11986" providerId="LiveId" clId="{E00440B9-FF97-4521-B91E-3FE0BC6BFA0A}" dt="2024-10-09T02:21:12.319" v="331" actId="20577"/>
+      <pc:docMkLst>
+        <pc:docMk/>
+      </pc:docMkLst>
+      <pc:sldChg chg="addSp modSp mod">
+        <pc:chgData name="Ronald Lehmer" userId="60fab73a6ba11986" providerId="LiveId" clId="{E00440B9-FF97-4521-B91E-3FE0BC6BFA0A}" dt="2024-10-09T02:21:12.319" v="331" actId="20577"/>
+        <pc:sldMkLst>
+          <pc:docMk/>
+          <pc:sldMk cId="1235310902" sldId="256"/>
+        </pc:sldMkLst>
+        <pc:spChg chg="mod">
+          <ac:chgData name="Ronald Lehmer" userId="60fab73a6ba11986" providerId="LiveId" clId="{E00440B9-FF97-4521-B91E-3FE0BC6BFA0A}" dt="2024-10-09T02:07:36.204" v="19" actId="14100"/>
+          <ac:spMkLst>
+            <pc:docMk/>
+            <pc:sldMk cId="1235310902" sldId="256"/>
+            <ac:spMk id="4" creationId="{D00C53B8-98E6-20CB-FE30-85E9A71F4717}"/>
+          </ac:spMkLst>
+        </pc:spChg>
+        <pc:spChg chg="mod">
+          <ac:chgData name="Ronald Lehmer" userId="60fab73a6ba11986" providerId="LiveId" clId="{E00440B9-FF97-4521-B91E-3FE0BC6BFA0A}" dt="2024-10-09T02:07:43.880" v="21" actId="14100"/>
+          <ac:spMkLst>
+            <pc:docMk/>
+            <pc:sldMk cId="1235310902" sldId="256"/>
+            <ac:spMk id="5" creationId="{CB56951E-8814-2632-6908-6432B2553A7C}"/>
+          </ac:spMkLst>
+        </pc:spChg>
+        <pc:spChg chg="mod">
+          <ac:chgData name="Ronald Lehmer" userId="60fab73a6ba11986" providerId="LiveId" clId="{E00440B9-FF97-4521-B91E-3FE0BC6BFA0A}" dt="2024-10-09T02:07:57.253" v="23" actId="14100"/>
+          <ac:spMkLst>
+            <pc:docMk/>
+            <pc:sldMk cId="1235310902" sldId="256"/>
+            <ac:spMk id="6" creationId="{E5A7EA01-8DC3-FDDA-4FA4-EE633AE393AE}"/>
+          </ac:spMkLst>
+        </pc:spChg>
+        <pc:spChg chg="mod">
+          <ac:chgData name="Ronald Lehmer" userId="60fab73a6ba11986" providerId="LiveId" clId="{E00440B9-FF97-4521-B91E-3FE0BC6BFA0A}" dt="2024-10-09T02:09:11.092" v="34" actId="1076"/>
+          <ac:spMkLst>
+            <pc:docMk/>
+            <pc:sldMk cId="1235310902" sldId="256"/>
+            <ac:spMk id="7" creationId="{D8850696-1F9D-6D4C-1A27-CDA544E9C98C}"/>
+          </ac:spMkLst>
+        </pc:spChg>
+        <pc:spChg chg="mod">
+          <ac:chgData name="Ronald Lehmer" userId="60fab73a6ba11986" providerId="LiveId" clId="{E00440B9-FF97-4521-B91E-3FE0BC6BFA0A}" dt="2024-10-09T02:08:35.937" v="31" actId="1076"/>
+          <ac:spMkLst>
+            <pc:docMk/>
+            <pc:sldMk cId="1235310902" sldId="256"/>
+            <ac:spMk id="8" creationId="{951548FC-22FC-875C-6B12-0054239CAFA5}"/>
+          </ac:spMkLst>
+        </pc:spChg>
+        <pc:spChg chg="mod">
+          <ac:chgData name="Ronald Lehmer" userId="60fab73a6ba11986" providerId="LiveId" clId="{E00440B9-FF97-4521-B91E-3FE0BC6BFA0A}" dt="2024-10-09T02:08:52.729" v="33" actId="1076"/>
+          <ac:spMkLst>
+            <pc:docMk/>
+            <pc:sldMk cId="1235310902" sldId="256"/>
+            <ac:spMk id="10" creationId="{9295AD14-93B7-C43A-798F-D6EFCB485796}"/>
+          </ac:spMkLst>
+        </pc:spChg>
+        <pc:spChg chg="mod">
+          <ac:chgData name="Ronald Lehmer" userId="60fab73a6ba11986" providerId="LiveId" clId="{E00440B9-FF97-4521-B91E-3FE0BC6BFA0A}" dt="2024-10-09T02:12:59.688" v="36" actId="1076"/>
+          <ac:spMkLst>
+            <pc:docMk/>
+            <pc:sldMk cId="1235310902" sldId="256"/>
+            <ac:spMk id="11" creationId="{8A75CBD2-8AFC-F8D7-088A-C6F4D409FD6E}"/>
+          </ac:spMkLst>
+        </pc:spChg>
+        <pc:spChg chg="mod">
+          <ac:chgData name="Ronald Lehmer" userId="60fab73a6ba11986" providerId="LiveId" clId="{E00440B9-FF97-4521-B91E-3FE0BC6BFA0A}" dt="2024-10-09T02:13:39.010" v="44" actId="14100"/>
+          <ac:spMkLst>
+            <pc:docMk/>
+            <pc:sldMk cId="1235310902" sldId="256"/>
+            <ac:spMk id="12" creationId="{1368BF68-B553-9CFA-C80F-C6A8E272638E}"/>
+          </ac:spMkLst>
+        </pc:spChg>
+        <pc:spChg chg="mod">
+          <ac:chgData name="Ronald Lehmer" userId="60fab73a6ba11986" providerId="LiveId" clId="{E00440B9-FF97-4521-B91E-3FE0BC6BFA0A}" dt="2024-10-09T02:13:42.696" v="45" actId="14100"/>
+          <ac:spMkLst>
+            <pc:docMk/>
+            <pc:sldMk cId="1235310902" sldId="256"/>
+            <ac:spMk id="13" creationId="{5D96D569-0F98-7E61-CEA4-87B03108D3D9}"/>
+          </ac:spMkLst>
+        </pc:spChg>
+        <pc:spChg chg="mod">
+          <ac:chgData name="Ronald Lehmer" userId="60fab73a6ba11986" providerId="LiveId" clId="{E00440B9-FF97-4521-B91E-3FE0BC6BFA0A}" dt="2024-10-09T02:13:47.562" v="46" actId="14100"/>
+          <ac:spMkLst>
+            <pc:docMk/>
+            <pc:sldMk cId="1235310902" sldId="256"/>
+            <ac:spMk id="14" creationId="{A2011E61-E3EA-365A-BDBA-7D03F8257EEE}"/>
+          </ac:spMkLst>
+        </pc:spChg>
+        <pc:spChg chg="mod">
+          <ac:chgData name="Ronald Lehmer" userId="60fab73a6ba11986" providerId="LiveId" clId="{E00440B9-FF97-4521-B91E-3FE0BC6BFA0A}" dt="2024-10-09T02:13:58.190" v="47" actId="1076"/>
+          <ac:spMkLst>
+            <pc:docMk/>
+            <pc:sldMk cId="1235310902" sldId="256"/>
+            <ac:spMk id="16" creationId="{530F8D82-3E91-4D87-02EA-C25C21C0B142}"/>
+          </ac:spMkLst>
+        </pc:spChg>
+        <pc:spChg chg="mod">
+          <ac:chgData name="Ronald Lehmer" userId="60fab73a6ba11986" providerId="LiveId" clId="{E00440B9-FF97-4521-B91E-3FE0BC6BFA0A}" dt="2024-10-09T02:14:07.742" v="48" actId="1076"/>
+          <ac:spMkLst>
+            <pc:docMk/>
+            <pc:sldMk cId="1235310902" sldId="256"/>
+            <ac:spMk id="17" creationId="{1442E934-84C5-4707-91BA-CADE5DDED503}"/>
+          </ac:spMkLst>
+        </pc:spChg>
+        <pc:spChg chg="mod">
+          <ac:chgData name="Ronald Lehmer" userId="60fab73a6ba11986" providerId="LiveId" clId="{E00440B9-FF97-4521-B91E-3FE0BC6BFA0A}" dt="2024-10-09T02:14:14.736" v="49" actId="1076"/>
+          <ac:spMkLst>
+            <pc:docMk/>
+            <pc:sldMk cId="1235310902" sldId="256"/>
+            <ac:spMk id="18" creationId="{FA841C9B-5F4E-3BFA-F288-C0F147A0EA96}"/>
+          </ac:spMkLst>
+        </pc:spChg>
+        <pc:spChg chg="mod">
+          <ac:chgData name="Ronald Lehmer" userId="60fab73a6ba11986" providerId="LiveId" clId="{E00440B9-FF97-4521-B91E-3FE0BC6BFA0A}" dt="2024-10-09T02:14:21.906" v="50" actId="1076"/>
+          <ac:spMkLst>
+            <pc:docMk/>
+            <pc:sldMk cId="1235310902" sldId="256"/>
+            <ac:spMk id="19" creationId="{3183A671-C717-57E6-E0A9-8B849EB3AA3A}"/>
+          </ac:spMkLst>
+        </pc:spChg>
+        <pc:spChg chg="mod">
+          <ac:chgData name="Ronald Lehmer" userId="60fab73a6ba11986" providerId="LiveId" clId="{E00440B9-FF97-4521-B91E-3FE0BC6BFA0A}" dt="2024-10-09T02:14:29.892" v="51" actId="1076"/>
+          <ac:spMkLst>
+            <pc:docMk/>
+            <pc:sldMk cId="1235310902" sldId="256"/>
+            <ac:spMk id="20" creationId="{2A81084D-1074-3CD6-CFFC-CF2D342A2701}"/>
+          </ac:spMkLst>
+        </pc:spChg>
+        <pc:spChg chg="mod">
+          <ac:chgData name="Ronald Lehmer" userId="60fab73a6ba11986" providerId="LiveId" clId="{E00440B9-FF97-4521-B91E-3FE0BC6BFA0A}" dt="2024-10-09T02:14:39.036" v="52" actId="1076"/>
+          <ac:spMkLst>
+            <pc:docMk/>
+            <pc:sldMk cId="1235310902" sldId="256"/>
+            <ac:spMk id="21" creationId="{76E16DD0-1FA9-3892-5064-4508A2A44711}"/>
+          </ac:spMkLst>
+        </pc:spChg>
+        <pc:spChg chg="mod">
+          <ac:chgData name="Ronald Lehmer" userId="60fab73a6ba11986" providerId="LiveId" clId="{E00440B9-FF97-4521-B91E-3FE0BC6BFA0A}" dt="2024-10-09T02:14:47.774" v="53" actId="1076"/>
+          <ac:spMkLst>
+            <pc:docMk/>
+            <pc:sldMk cId="1235310902" sldId="256"/>
+            <ac:spMk id="22" creationId="{E4706EDE-6C95-FB52-F4BD-110C9CC071D4}"/>
+          </ac:spMkLst>
+        </pc:spChg>
+        <pc:spChg chg="mod">
+          <ac:chgData name="Ronald Lehmer" userId="60fab73a6ba11986" providerId="LiveId" clId="{E00440B9-FF97-4521-B91E-3FE0BC6BFA0A}" dt="2024-10-09T02:14:56.920" v="54" actId="1076"/>
+          <ac:spMkLst>
+            <pc:docMk/>
+            <pc:sldMk cId="1235310902" sldId="256"/>
+            <ac:spMk id="23" creationId="{A5776ABA-9E2E-BC36-A133-53986D86EF7E}"/>
+          </ac:spMkLst>
+        </pc:spChg>
+        <pc:spChg chg="mod">
+          <ac:chgData name="Ronald Lehmer" userId="60fab73a6ba11986" providerId="LiveId" clId="{E00440B9-FF97-4521-B91E-3FE0BC6BFA0A}" dt="2024-10-09T02:15:06.280" v="55" actId="1076"/>
+          <ac:spMkLst>
+            <pc:docMk/>
+            <pc:sldMk cId="1235310902" sldId="256"/>
+            <ac:spMk id="24" creationId="{C027CFA1-E6E8-A4E3-22E3-7CF6365C9804}"/>
+          </ac:spMkLst>
+        </pc:spChg>
+        <pc:spChg chg="mod">
+          <ac:chgData name="Ronald Lehmer" userId="60fab73a6ba11986" providerId="LiveId" clId="{E00440B9-FF97-4521-B91E-3FE0BC6BFA0A}" dt="2024-10-09T02:15:12.932" v="56" actId="1076"/>
+          <ac:spMkLst>
+            <pc:docMk/>
+            <pc:sldMk cId="1235310902" sldId="256"/>
+            <ac:spMk id="25" creationId="{2742B460-2234-A750-056E-FAC454DD3AD0}"/>
+          </ac:spMkLst>
+        </pc:spChg>
+        <pc:spChg chg="mod">
+          <ac:chgData name="Ronald Lehmer" userId="60fab73a6ba11986" providerId="LiveId" clId="{E00440B9-FF97-4521-B91E-3FE0BC6BFA0A}" dt="2024-10-09T02:05:36.380" v="18" actId="1076"/>
+          <ac:spMkLst>
+            <pc:docMk/>
+            <pc:sldMk cId="1235310902" sldId="256"/>
+            <ac:spMk id="48" creationId="{4117BE43-874E-A64D-1E6C-BC5765787271}"/>
+          </ac:spMkLst>
+        </pc:spChg>
+        <pc:spChg chg="add mod">
+          <ac:chgData name="Ronald Lehmer" userId="60fab73a6ba11986" providerId="LiveId" clId="{E00440B9-FF97-4521-B91E-3FE0BC6BFA0A}" dt="2024-10-09T02:19:02.591" v="77" actId="20577"/>
+          <ac:spMkLst>
+            <pc:docMk/>
+            <pc:sldMk cId="1235310902" sldId="256"/>
+            <ac:spMk id="108" creationId="{9F61C4D8-4CD7-3808-0A7E-72C2B7149D09}"/>
+          </ac:spMkLst>
+        </pc:spChg>
+        <pc:spChg chg="add mod">
+          <ac:chgData name="Ronald Lehmer" userId="60fab73a6ba11986" providerId="LiveId" clId="{E00440B9-FF97-4521-B91E-3FE0BC6BFA0A}" dt="2024-10-09T02:20:29.119" v="225" actId="20577"/>
+          <ac:spMkLst>
+            <pc:docMk/>
+            <pc:sldMk cId="1235310902" sldId="256"/>
+            <ac:spMk id="109" creationId="{AC14E6F8-7329-47A6-2310-B180E0CF8ABF}"/>
+          </ac:spMkLst>
+        </pc:spChg>
+        <pc:spChg chg="add mod">
+          <ac:chgData name="Ronald Lehmer" userId="60fab73a6ba11986" providerId="LiveId" clId="{E00440B9-FF97-4521-B91E-3FE0BC6BFA0A}" dt="2024-10-09T02:19:38.351" v="105" actId="20577"/>
+          <ac:spMkLst>
+            <pc:docMk/>
+            <pc:sldMk cId="1235310902" sldId="256"/>
+            <ac:spMk id="111" creationId="{3687D3D1-F21E-3975-5513-FC0CCC170B71}"/>
+          </ac:spMkLst>
+        </pc:spChg>
+        <pc:spChg chg="add mod">
+          <ac:chgData name="Ronald Lehmer" userId="60fab73a6ba11986" providerId="LiveId" clId="{E00440B9-FF97-4521-B91E-3FE0BC6BFA0A}" dt="2024-10-09T02:20:46.799" v="268" actId="20577"/>
+          <ac:spMkLst>
+            <pc:docMk/>
+            <pc:sldMk cId="1235310902" sldId="256"/>
+            <ac:spMk id="112" creationId="{9F0FBBC9-6EB2-C141-B8AA-D872876F4CC3}"/>
+          </ac:spMkLst>
+        </pc:spChg>
+        <pc:spChg chg="add mod">
+          <ac:chgData name="Ronald Lehmer" userId="60fab73a6ba11986" providerId="LiveId" clId="{E00440B9-FF97-4521-B91E-3FE0BC6BFA0A}" dt="2024-10-09T02:19:48.671" v="131" actId="20577"/>
+          <ac:spMkLst>
+            <pc:docMk/>
+            <pc:sldMk cId="1235310902" sldId="256"/>
+            <ac:spMk id="114" creationId="{1784FF3D-E4E0-AB64-951A-F6BDA31080BC}"/>
+          </ac:spMkLst>
+        </pc:spChg>
+        <pc:spChg chg="add mod">
+          <ac:chgData name="Ronald Lehmer" userId="60fab73a6ba11986" providerId="LiveId" clId="{E00440B9-FF97-4521-B91E-3FE0BC6BFA0A}" dt="2024-10-09T02:21:02.495" v="310" actId="20577"/>
+          <ac:spMkLst>
+            <pc:docMk/>
+            <pc:sldMk cId="1235310902" sldId="256"/>
+            <ac:spMk id="115" creationId="{4C0E903F-E4C6-FEE0-DF99-8D877A4B258A}"/>
+          </ac:spMkLst>
+        </pc:spChg>
+        <pc:spChg chg="add mod">
+          <ac:chgData name="Ronald Lehmer" userId="60fab73a6ba11986" providerId="LiveId" clId="{E00440B9-FF97-4521-B91E-3FE0BC6BFA0A}" dt="2024-10-09T02:19:55.071" v="145" actId="20577"/>
+          <ac:spMkLst>
+            <pc:docMk/>
+            <pc:sldMk cId="1235310902" sldId="256"/>
+            <ac:spMk id="117" creationId="{D8C6DF41-399A-9DF3-1793-15C972DBD912}"/>
+          </ac:spMkLst>
+        </pc:spChg>
+        <pc:spChg chg="add mod">
+          <ac:chgData name="Ronald Lehmer" userId="60fab73a6ba11986" providerId="LiveId" clId="{E00440B9-FF97-4521-B91E-3FE0BC6BFA0A}" dt="2024-10-09T02:21:12.319" v="331" actId="20577"/>
+          <ac:spMkLst>
+            <pc:docMk/>
+            <pc:sldMk cId="1235310902" sldId="256"/>
+            <ac:spMk id="118" creationId="{6675D6E3-DC1B-BD1C-E577-DD7478BDCA76}"/>
+          </ac:spMkLst>
+        </pc:spChg>
+        <pc:cxnChg chg="mod">
+          <ac:chgData name="Ronald Lehmer" userId="60fab73a6ba11986" providerId="LiveId" clId="{E00440B9-FF97-4521-B91E-3FE0BC6BFA0A}" dt="2024-10-09T02:07:43.880" v="21" actId="14100"/>
+          <ac:cxnSpMkLst>
+            <pc:docMk/>
+            <pc:sldMk cId="1235310902" sldId="256"/>
+            <ac:cxnSpMk id="31" creationId="{807AB19D-8C86-A7DC-2887-9A350F0B588C}"/>
+          </ac:cxnSpMkLst>
+        </pc:cxnChg>
+        <pc:cxnChg chg="mod">
+          <ac:chgData name="Ronald Lehmer" userId="60fab73a6ba11986" providerId="LiveId" clId="{E00440B9-FF97-4521-B91E-3FE0BC6BFA0A}" dt="2024-10-09T02:07:57.253" v="23" actId="14100"/>
+          <ac:cxnSpMkLst>
+            <pc:docMk/>
+            <pc:sldMk cId="1235310902" sldId="256"/>
+            <ac:cxnSpMk id="33" creationId="{A5936E95-2FD6-1F39-F7AF-BF491EBDBF88}"/>
+          </ac:cxnSpMkLst>
+        </pc:cxnChg>
+        <pc:cxnChg chg="mod">
+          <ac:chgData name="Ronald Lehmer" userId="60fab73a6ba11986" providerId="LiveId" clId="{E00440B9-FF97-4521-B91E-3FE0BC6BFA0A}" dt="2024-10-09T02:09:11.092" v="34" actId="1076"/>
+          <ac:cxnSpMkLst>
+            <pc:docMk/>
+            <pc:sldMk cId="1235310902" sldId="256"/>
+            <ac:cxnSpMk id="35" creationId="{E615F837-9CB4-C05D-2848-F2DC527B5686}"/>
+          </ac:cxnSpMkLst>
+        </pc:cxnChg>
+        <pc:cxnChg chg="mod">
+          <ac:chgData name="Ronald Lehmer" userId="60fab73a6ba11986" providerId="LiveId" clId="{E00440B9-FF97-4521-B91E-3FE0BC6BFA0A}" dt="2024-10-09T02:09:11.092" v="34" actId="1076"/>
+          <ac:cxnSpMkLst>
+            <pc:docMk/>
+            <pc:sldMk cId="1235310902" sldId="256"/>
+            <ac:cxnSpMk id="37" creationId="{7B00AC9F-E346-6504-D098-E4B1D633FAE9}"/>
+          </ac:cxnSpMkLst>
+        </pc:cxnChg>
+        <pc:cxnChg chg="mod">
+          <ac:chgData name="Ronald Lehmer" userId="60fab73a6ba11986" providerId="LiveId" clId="{E00440B9-FF97-4521-B91E-3FE0BC6BFA0A}" dt="2024-10-09T02:08:52.729" v="33" actId="1076"/>
+          <ac:cxnSpMkLst>
+            <pc:docMk/>
+            <pc:sldMk cId="1235310902" sldId="256"/>
+            <ac:cxnSpMk id="39" creationId="{B3E2BF0F-6E4A-1027-658D-6E05BED82BFC}"/>
+          </ac:cxnSpMkLst>
+        </pc:cxnChg>
+        <pc:cxnChg chg="mod">
+          <ac:chgData name="Ronald Lehmer" userId="60fab73a6ba11986" providerId="LiveId" clId="{E00440B9-FF97-4521-B91E-3FE0BC6BFA0A}" dt="2024-10-09T02:12:59.688" v="36" actId="1076"/>
+          <ac:cxnSpMkLst>
+            <pc:docMk/>
+            <pc:sldMk cId="1235310902" sldId="256"/>
+            <ac:cxnSpMk id="41" creationId="{589354CC-E65F-20B5-16D8-8AE07D811A55}"/>
+          </ac:cxnSpMkLst>
+        </pc:cxnChg>
+        <pc:cxnChg chg="mod">
+          <ac:chgData name="Ronald Lehmer" userId="60fab73a6ba11986" providerId="LiveId" clId="{E00440B9-FF97-4521-B91E-3FE0BC6BFA0A}" dt="2024-10-09T02:13:39.010" v="44" actId="14100"/>
+          <ac:cxnSpMkLst>
+            <pc:docMk/>
+            <pc:sldMk cId="1235310902" sldId="256"/>
+            <ac:cxnSpMk id="43" creationId="{14915982-54DC-07E9-D3FE-95457C0C25F2}"/>
+          </ac:cxnSpMkLst>
+        </pc:cxnChg>
+        <pc:cxnChg chg="mod">
+          <ac:chgData name="Ronald Lehmer" userId="60fab73a6ba11986" providerId="LiveId" clId="{E00440B9-FF97-4521-B91E-3FE0BC6BFA0A}" dt="2024-10-09T02:13:42.696" v="45" actId="14100"/>
+          <ac:cxnSpMkLst>
+            <pc:docMk/>
+            <pc:sldMk cId="1235310902" sldId="256"/>
+            <ac:cxnSpMk id="45" creationId="{0D8652D3-682D-B453-1760-4E9E76087FF1}"/>
+          </ac:cxnSpMkLst>
+        </pc:cxnChg>
+        <pc:cxnChg chg="mod">
+          <ac:chgData name="Ronald Lehmer" userId="60fab73a6ba11986" providerId="LiveId" clId="{E00440B9-FF97-4521-B91E-3FE0BC6BFA0A}" dt="2024-10-09T02:13:47.562" v="46" actId="14100"/>
+          <ac:cxnSpMkLst>
+            <pc:docMk/>
+            <pc:sldMk cId="1235310902" sldId="256"/>
+            <ac:cxnSpMk id="47" creationId="{72F9E48E-A2A9-73D4-C0C8-1A06B80C1525}"/>
+          </ac:cxnSpMkLst>
+        </pc:cxnChg>
+        <pc:cxnChg chg="mod">
+          <ac:chgData name="Ronald Lehmer" userId="60fab73a6ba11986" providerId="LiveId" clId="{E00440B9-FF97-4521-B91E-3FE0BC6BFA0A}" dt="2024-10-09T02:07:36.204" v="19" actId="14100"/>
+          <ac:cxnSpMkLst>
+            <pc:docMk/>
+            <pc:sldMk cId="1235310902" sldId="256"/>
+            <ac:cxnSpMk id="52" creationId="{534FA83B-170A-CAD6-D2F7-93EB9DC40E89}"/>
+          </ac:cxnSpMkLst>
+        </pc:cxnChg>
+        <pc:cxnChg chg="mod">
+          <ac:chgData name="Ronald Lehmer" userId="60fab73a6ba11986" providerId="LiveId" clId="{E00440B9-FF97-4521-B91E-3FE0BC6BFA0A}" dt="2024-10-09T02:05:36.380" v="18" actId="1076"/>
+          <ac:cxnSpMkLst>
+            <pc:docMk/>
+            <pc:sldMk cId="1235310902" sldId="256"/>
+            <ac:cxnSpMk id="54" creationId="{497D1591-4486-8A1B-CE25-FB6D0AE52E7E}"/>
+          </ac:cxnSpMkLst>
+        </pc:cxnChg>
+        <pc:cxnChg chg="add mod">
+          <ac:chgData name="Ronald Lehmer" userId="60fab73a6ba11986" providerId="LiveId" clId="{E00440B9-FF97-4521-B91E-3FE0BC6BFA0A}" dt="2024-10-09T02:18:41.132" v="58" actId="1076"/>
+          <ac:cxnSpMkLst>
+            <pc:docMk/>
+            <pc:sldMk cId="1235310902" sldId="256"/>
+            <ac:cxnSpMk id="110" creationId="{4B34D4F3-2AB3-C7DC-4575-CDDD5BB7D968}"/>
+          </ac:cxnSpMkLst>
+        </pc:cxnChg>
+        <pc:cxnChg chg="add mod">
+          <ac:chgData name="Ronald Lehmer" userId="60fab73a6ba11986" providerId="LiveId" clId="{E00440B9-FF97-4521-B91E-3FE0BC6BFA0A}" dt="2024-10-09T02:18:43.441" v="59"/>
+          <ac:cxnSpMkLst>
+            <pc:docMk/>
+            <pc:sldMk cId="1235310902" sldId="256"/>
+            <ac:cxnSpMk id="113" creationId="{EC4544CB-B1BD-6B5D-C66C-17BDAB948217}"/>
+          </ac:cxnSpMkLst>
+        </pc:cxnChg>
+        <pc:cxnChg chg="add mod">
+          <ac:chgData name="Ronald Lehmer" userId="60fab73a6ba11986" providerId="LiveId" clId="{E00440B9-FF97-4521-B91E-3FE0BC6BFA0A}" dt="2024-10-09T02:18:43.601" v="60"/>
+          <ac:cxnSpMkLst>
+            <pc:docMk/>
+            <pc:sldMk cId="1235310902" sldId="256"/>
+            <ac:cxnSpMk id="116" creationId="{367EDA89-8D1A-38E7-BF72-990DA0D84DCD}"/>
+          </ac:cxnSpMkLst>
+        </pc:cxnChg>
+        <pc:cxnChg chg="add mod">
+          <ac:chgData name="Ronald Lehmer" userId="60fab73a6ba11986" providerId="LiveId" clId="{E00440B9-FF97-4521-B91E-3FE0BC6BFA0A}" dt="2024-10-09T02:18:43.777" v="61"/>
+          <ac:cxnSpMkLst>
+            <pc:docMk/>
+            <pc:sldMk cId="1235310902" sldId="256"/>
+            <ac:cxnSpMk id="119" creationId="{61404695-EA98-C564-535D-718AA27A4469}"/>
+          </ac:cxnSpMkLst>
+        </pc:cxnChg>
+      </pc:sldChg>
+    </pc:docChg>
+  </pc:docChgLst>
+</pc:chgInfo>
 </file>
 
 <file path=ppt/slideLayouts/slideLayout1.xml><?xml version="1.0" encoding="utf-8"?>
@@ -254,7 +640,7 @@
           <a:p>
             <a:fld id="{400E3A91-CC8F-4806-A117-75E379923ED9}" type="datetimeFigureOut">
               <a:rPr lang="en-US" smtClean="0"/>
-              <a:t>12/23/2023</a:t>
+              <a:t>10/8/2024</a:t>
             </a:fld>
             <a:endParaRPr lang="en-US"/>
           </a:p>
@@ -452,7 +838,7 @@
           <a:p>
             <a:fld id="{400E3A91-CC8F-4806-A117-75E379923ED9}" type="datetimeFigureOut">
               <a:rPr lang="en-US" smtClean="0"/>
-              <a:t>12/23/2023</a:t>
+              <a:t>10/8/2024</a:t>
             </a:fld>
             <a:endParaRPr lang="en-US"/>
           </a:p>
@@ -660,7 +1046,7 @@
           <a:p>
             <a:fld id="{400E3A91-CC8F-4806-A117-75E379923ED9}" type="datetimeFigureOut">
               <a:rPr lang="en-US" smtClean="0"/>
-              <a:t>12/23/2023</a:t>
+              <a:t>10/8/2024</a:t>
             </a:fld>
             <a:endParaRPr lang="en-US"/>
           </a:p>
@@ -858,7 +1244,7 @@
           <a:p>
             <a:fld id="{400E3A91-CC8F-4806-A117-75E379923ED9}" type="datetimeFigureOut">
               <a:rPr lang="en-US" smtClean="0"/>
-              <a:t>12/23/2023</a:t>
+              <a:t>10/8/2024</a:t>
             </a:fld>
             <a:endParaRPr lang="en-US"/>
           </a:p>
@@ -1133,7 +1519,7 @@
           <a:p>
             <a:fld id="{400E3A91-CC8F-4806-A117-75E379923ED9}" type="datetimeFigureOut">
               <a:rPr lang="en-US" smtClean="0"/>
-              <a:t>12/23/2023</a:t>
+              <a:t>10/8/2024</a:t>
             </a:fld>
             <a:endParaRPr lang="en-US"/>
           </a:p>
@@ -1398,7 +1784,7 @@
           <a:p>
             <a:fld id="{400E3A91-CC8F-4806-A117-75E379923ED9}" type="datetimeFigureOut">
               <a:rPr lang="en-US" smtClean="0"/>
-              <a:t>12/23/2023</a:t>
+              <a:t>10/8/2024</a:t>
             </a:fld>
             <a:endParaRPr lang="en-US"/>
           </a:p>
@@ -1810,7 +2196,7 @@
           <a:p>
             <a:fld id="{400E3A91-CC8F-4806-A117-75E379923ED9}" type="datetimeFigureOut">
               <a:rPr lang="en-US" smtClean="0"/>
-              <a:t>12/23/2023</a:t>
+              <a:t>10/8/2024</a:t>
             </a:fld>
             <a:endParaRPr lang="en-US"/>
           </a:p>
@@ -1951,7 +2337,7 @@
           <a:p>
             <a:fld id="{400E3A91-CC8F-4806-A117-75E379923ED9}" type="datetimeFigureOut">
               <a:rPr lang="en-US" smtClean="0"/>
-              <a:t>12/23/2023</a:t>
+              <a:t>10/8/2024</a:t>
             </a:fld>
             <a:endParaRPr lang="en-US"/>
           </a:p>
@@ -2064,7 +2450,7 @@
           <a:p>
             <a:fld id="{400E3A91-CC8F-4806-A117-75E379923ED9}" type="datetimeFigureOut">
               <a:rPr lang="en-US" smtClean="0"/>
-              <a:t>12/23/2023</a:t>
+              <a:t>10/8/2024</a:t>
             </a:fld>
             <a:endParaRPr lang="en-US"/>
           </a:p>
@@ -2375,7 +2761,7 @@
           <a:p>
             <a:fld id="{400E3A91-CC8F-4806-A117-75E379923ED9}" type="datetimeFigureOut">
               <a:rPr lang="en-US" smtClean="0"/>
-              <a:t>12/23/2023</a:t>
+              <a:t>10/8/2024</a:t>
             </a:fld>
             <a:endParaRPr lang="en-US"/>
           </a:p>
@@ -2663,7 +3049,7 @@
           <a:p>
             <a:fld id="{400E3A91-CC8F-4806-A117-75E379923ED9}" type="datetimeFigureOut">
               <a:rPr lang="en-US" smtClean="0"/>
-              <a:t>12/23/2023</a:t>
+              <a:t>10/8/2024</a:t>
             </a:fld>
             <a:endParaRPr lang="en-US"/>
           </a:p>
@@ -2904,7 +3290,7 @@
           <a:p>
             <a:fld id="{400E3A91-CC8F-4806-A117-75E379923ED9}" type="datetimeFigureOut">
               <a:rPr lang="en-US" smtClean="0"/>
-              <a:t>12/23/2023</a:t>
+              <a:t>10/8/2024</a:t>
             </a:fld>
             <a:endParaRPr lang="en-US"/>
           </a:p>
@@ -3335,8 +3721,8 @@
         </p:nvSpPr>
         <p:spPr>
           <a:xfrm>
-            <a:off x="2326242" y="1015365"/>
-            <a:ext cx="1042988" cy="371475"/>
+            <a:off x="1917577" y="1015366"/>
+            <a:ext cx="1451653" cy="201950"/>
           </a:xfrm>
           <a:prstGeom prst="roundRect">
             <a:avLst/>
@@ -3384,8 +3770,8 @@
         </p:nvSpPr>
         <p:spPr>
           <a:xfrm>
-            <a:off x="2274157" y="1588790"/>
-            <a:ext cx="1147158" cy="371475"/>
+            <a:off x="1917577" y="1403052"/>
+            <a:ext cx="1451653" cy="201951"/>
           </a:xfrm>
           <a:prstGeom prst="roundRect">
             <a:avLst/>
@@ -3437,8 +3823,8 @@
         </p:nvSpPr>
         <p:spPr>
           <a:xfrm>
-            <a:off x="2323384" y="2143125"/>
-            <a:ext cx="1048704" cy="371475"/>
+            <a:off x="1917577" y="1797275"/>
+            <a:ext cx="1454511" cy="201950"/>
           </a:xfrm>
           <a:prstGeom prst="roundRect">
             <a:avLst/>
@@ -3486,8 +3872,8 @@
         </p:nvSpPr>
         <p:spPr>
           <a:xfrm>
-            <a:off x="2323384" y="2707139"/>
-            <a:ext cx="1048704" cy="371475"/>
+            <a:off x="1909784" y="2184821"/>
+            <a:ext cx="1454511" cy="201951"/>
           </a:xfrm>
           <a:prstGeom prst="roundRect">
             <a:avLst/>
@@ -3535,8 +3921,8 @@
         </p:nvSpPr>
         <p:spPr>
           <a:xfrm>
-            <a:off x="2304572" y="3270885"/>
-            <a:ext cx="1086328" cy="371475"/>
+            <a:off x="1904850" y="2553008"/>
+            <a:ext cx="1451653" cy="201951"/>
           </a:xfrm>
           <a:prstGeom prst="roundRect">
             <a:avLst/>
@@ -3565,7 +3951,7 @@
             <a:pPr algn="ctr"/>
             <a:r>
               <a:rPr lang="en-US" sz="1200" dirty="0"/>
-              <a:t>Start I2C Wire Interface</a:t>
+              <a:t>Start I2C Wire Int.</a:t>
             </a:r>
           </a:p>
         </p:txBody>
@@ -3584,8 +3970,8 @@
         </p:nvSpPr>
         <p:spPr>
           <a:xfrm>
-            <a:off x="2323384" y="3834765"/>
-            <a:ext cx="1048704" cy="371475"/>
+            <a:off x="1901992" y="2921195"/>
+            <a:ext cx="1454511" cy="201951"/>
           </a:xfrm>
           <a:prstGeom prst="roundRect">
             <a:avLst/>
@@ -3633,8 +4019,8 @@
         </p:nvSpPr>
         <p:spPr>
           <a:xfrm>
-            <a:off x="2323384" y="4408170"/>
-            <a:ext cx="1048704" cy="371475"/>
+            <a:off x="1901991" y="3305058"/>
+            <a:ext cx="1454511" cy="197446"/>
           </a:xfrm>
           <a:prstGeom prst="roundRect">
             <a:avLst/>
@@ -3682,8 +4068,8 @@
         </p:nvSpPr>
         <p:spPr>
           <a:xfrm>
-            <a:off x="2323384" y="4972050"/>
-            <a:ext cx="1048704" cy="371475"/>
+            <a:off x="1901990" y="3700015"/>
+            <a:ext cx="1454511" cy="197447"/>
           </a:xfrm>
           <a:prstGeom prst="roundRect">
             <a:avLst/>
@@ -3731,8 +4117,8 @@
         </p:nvSpPr>
         <p:spPr>
           <a:xfrm>
-            <a:off x="2323384" y="5535930"/>
-            <a:ext cx="1048704" cy="371475"/>
+            <a:off x="1901989" y="4124949"/>
+            <a:ext cx="1454511" cy="197446"/>
           </a:xfrm>
           <a:prstGeom prst="roundRect">
             <a:avLst/>
@@ -3780,8 +4166,8 @@
         </p:nvSpPr>
         <p:spPr>
           <a:xfrm>
-            <a:off x="2323384" y="6071235"/>
-            <a:ext cx="1048704" cy="371475"/>
+            <a:off x="1901988" y="4549946"/>
+            <a:ext cx="1454511" cy="197446"/>
           </a:xfrm>
           <a:prstGeom prst="roundRect">
             <a:avLst/>
@@ -3829,7 +4215,7 @@
         </p:nvSpPr>
         <p:spPr>
           <a:xfrm>
-            <a:off x="3482340" y="1062603"/>
+            <a:off x="3482340" y="977841"/>
             <a:ext cx="3081677" cy="276999"/>
           </a:xfrm>
           <a:prstGeom prst="rect">
@@ -3864,7 +4250,7 @@
         </p:nvSpPr>
         <p:spPr>
           <a:xfrm>
-            <a:off x="3482340" y="1626483"/>
+            <a:off x="3482340" y="1368904"/>
             <a:ext cx="2136932" cy="276999"/>
           </a:xfrm>
           <a:prstGeom prst="rect">
@@ -3899,7 +4285,7 @@
         </p:nvSpPr>
         <p:spPr>
           <a:xfrm>
-            <a:off x="3482340" y="2190363"/>
+            <a:off x="3482340" y="1759750"/>
             <a:ext cx="1986698" cy="276999"/>
           </a:xfrm>
           <a:prstGeom prst="rect">
@@ -3934,7 +4320,7 @@
         </p:nvSpPr>
         <p:spPr>
           <a:xfrm>
-            <a:off x="3482340" y="2662044"/>
+            <a:off x="3482340" y="2059109"/>
             <a:ext cx="4358244" cy="461665"/>
           </a:xfrm>
           <a:prstGeom prst="rect">
@@ -3975,7 +4361,7 @@
         </p:nvSpPr>
         <p:spPr>
           <a:xfrm>
-            <a:off x="3482340" y="3318122"/>
+            <a:off x="3482340" y="2511093"/>
             <a:ext cx="2662524" cy="276999"/>
           </a:xfrm>
           <a:prstGeom prst="rect">
@@ -4010,7 +4396,7 @@
         </p:nvSpPr>
         <p:spPr>
           <a:xfrm>
-            <a:off x="3482340" y="3882002"/>
+            <a:off x="3482340" y="2879343"/>
             <a:ext cx="3927037" cy="276999"/>
           </a:xfrm>
           <a:prstGeom prst="rect">
@@ -4045,7 +4431,7 @@
         </p:nvSpPr>
         <p:spPr>
           <a:xfrm>
-            <a:off x="3482340" y="4455408"/>
+            <a:off x="3482340" y="3265281"/>
             <a:ext cx="4205254" cy="276999"/>
           </a:xfrm>
           <a:prstGeom prst="rect">
@@ -4080,7 +4466,7 @@
         </p:nvSpPr>
         <p:spPr>
           <a:xfrm>
-            <a:off x="3482340" y="5019287"/>
+            <a:off x="3482340" y="3660690"/>
             <a:ext cx="4018857" cy="276999"/>
           </a:xfrm>
           <a:prstGeom prst="rect">
@@ -4115,7 +4501,7 @@
         </p:nvSpPr>
         <p:spPr>
           <a:xfrm>
-            <a:off x="3482340" y="5583167"/>
+            <a:off x="3482340" y="4079033"/>
             <a:ext cx="3658374" cy="276999"/>
           </a:xfrm>
           <a:prstGeom prst="rect">
@@ -4150,7 +4536,7 @@
         </p:nvSpPr>
         <p:spPr>
           <a:xfrm>
-            <a:off x="3482340" y="6118473"/>
+            <a:off x="3482340" y="4510169"/>
             <a:ext cx="4384983" cy="276999"/>
           </a:xfrm>
           <a:prstGeom prst="rect">
@@ -4189,8 +4575,8 @@
         </p:nvCxnSpPr>
         <p:spPr>
           <a:xfrm>
-            <a:off x="2847736" y="1386840"/>
-            <a:ext cx="0" cy="201950"/>
+            <a:off x="2643404" y="1217316"/>
+            <a:ext cx="0" cy="185736"/>
           </a:xfrm>
           <a:prstGeom prst="straightConnector1">
             <a:avLst/>
@@ -4232,8 +4618,8 @@
         </p:nvCxnSpPr>
         <p:spPr>
           <a:xfrm>
-            <a:off x="2847736" y="1960265"/>
-            <a:ext cx="0" cy="182860"/>
+            <a:off x="2643404" y="1605003"/>
+            <a:ext cx="1429" cy="192272"/>
           </a:xfrm>
           <a:prstGeom prst="straightConnector1">
             <a:avLst/>
@@ -4267,15 +4653,16 @@
             </a:extLst>
           </p:cNvPr>
           <p:cNvCxnSpPr>
+            <a:cxnSpLocks/>
             <a:stCxn id="6" idx="2"/>
             <a:endCxn id="7" idx="0"/>
           </p:cNvCxnSpPr>
           <p:nvPr/>
         </p:nvCxnSpPr>
         <p:spPr>
-          <a:xfrm>
-            <a:off x="2847736" y="2514600"/>
-            <a:ext cx="0" cy="192539"/>
+          <a:xfrm flipH="1">
+            <a:off x="2637040" y="1999225"/>
+            <a:ext cx="7793" cy="185596"/>
           </a:xfrm>
           <a:prstGeom prst="straightConnector1">
             <a:avLst/>
@@ -4309,15 +4696,16 @@
             </a:extLst>
           </p:cNvPr>
           <p:cNvCxnSpPr>
+            <a:cxnSpLocks/>
             <a:stCxn id="7" idx="2"/>
             <a:endCxn id="8" idx="0"/>
           </p:cNvCxnSpPr>
           <p:nvPr/>
         </p:nvCxnSpPr>
         <p:spPr>
-          <a:xfrm>
-            <a:off x="2847736" y="3078614"/>
-            <a:ext cx="0" cy="192271"/>
+          <a:xfrm flipH="1">
+            <a:off x="2630677" y="2386772"/>
+            <a:ext cx="6363" cy="166236"/>
           </a:xfrm>
           <a:prstGeom prst="straightConnector1">
             <a:avLst/>
@@ -4351,15 +4739,16 @@
             </a:extLst>
           </p:cNvPr>
           <p:cNvCxnSpPr>
+            <a:cxnSpLocks/>
             <a:stCxn id="8" idx="2"/>
             <a:endCxn id="10" idx="0"/>
           </p:cNvCxnSpPr>
           <p:nvPr/>
         </p:nvCxnSpPr>
         <p:spPr>
-          <a:xfrm>
-            <a:off x="2847736" y="3642360"/>
-            <a:ext cx="0" cy="192405"/>
+          <a:xfrm flipH="1">
+            <a:off x="2629248" y="2754959"/>
+            <a:ext cx="1429" cy="166236"/>
           </a:xfrm>
           <a:prstGeom prst="straightConnector1">
             <a:avLst/>
@@ -4393,15 +4782,16 @@
             </a:extLst>
           </p:cNvPr>
           <p:cNvCxnSpPr>
+            <a:cxnSpLocks/>
             <a:stCxn id="10" idx="2"/>
             <a:endCxn id="11" idx="0"/>
           </p:cNvCxnSpPr>
           <p:nvPr/>
         </p:nvCxnSpPr>
         <p:spPr>
-          <a:xfrm>
-            <a:off x="2847736" y="4206240"/>
-            <a:ext cx="0" cy="201930"/>
+          <a:xfrm flipH="1">
+            <a:off x="2629247" y="3123146"/>
+            <a:ext cx="1" cy="181912"/>
           </a:xfrm>
           <a:prstGeom prst="straightConnector1">
             <a:avLst/>
@@ -4435,15 +4825,16 @@
             </a:extLst>
           </p:cNvPr>
           <p:cNvCxnSpPr>
+            <a:cxnSpLocks/>
             <a:stCxn id="11" idx="2"/>
             <a:endCxn id="12" idx="0"/>
           </p:cNvCxnSpPr>
           <p:nvPr/>
         </p:nvCxnSpPr>
         <p:spPr>
-          <a:xfrm>
-            <a:off x="2847736" y="4779645"/>
-            <a:ext cx="0" cy="192405"/>
+          <a:xfrm flipH="1">
+            <a:off x="2629246" y="3502504"/>
+            <a:ext cx="1" cy="197511"/>
           </a:xfrm>
           <a:prstGeom prst="straightConnector1">
             <a:avLst/>
@@ -4477,15 +4868,16 @@
             </a:extLst>
           </p:cNvPr>
           <p:cNvCxnSpPr>
+            <a:cxnSpLocks/>
             <a:stCxn id="12" idx="2"/>
             <a:endCxn id="13" idx="0"/>
           </p:cNvCxnSpPr>
           <p:nvPr/>
         </p:nvCxnSpPr>
         <p:spPr>
-          <a:xfrm>
-            <a:off x="2847736" y="5343525"/>
-            <a:ext cx="0" cy="192405"/>
+          <a:xfrm flipH="1">
+            <a:off x="2629245" y="3897462"/>
+            <a:ext cx="1" cy="227487"/>
           </a:xfrm>
           <a:prstGeom prst="straightConnector1">
             <a:avLst/>
@@ -4519,15 +4911,16 @@
             </a:extLst>
           </p:cNvPr>
           <p:cNvCxnSpPr>
+            <a:cxnSpLocks/>
             <a:stCxn id="13" idx="2"/>
             <a:endCxn id="14" idx="0"/>
           </p:cNvCxnSpPr>
           <p:nvPr/>
         </p:nvCxnSpPr>
         <p:spPr>
-          <a:xfrm>
-            <a:off x="2847736" y="5907405"/>
-            <a:ext cx="0" cy="163830"/>
+          <a:xfrm flipH="1">
+            <a:off x="2629244" y="4322395"/>
+            <a:ext cx="1" cy="227551"/>
           </a:xfrm>
           <a:prstGeom prst="straightConnector1">
             <a:avLst/>
@@ -4565,7 +4958,7 @@
         </p:nvSpPr>
         <p:spPr>
           <a:xfrm>
-            <a:off x="1587688" y="444618"/>
+            <a:off x="1383356" y="437197"/>
             <a:ext cx="1042988" cy="371475"/>
           </a:xfrm>
           <a:prstGeom prst="roundRect">
@@ -4610,14 +5003,15 @@
             </a:extLst>
           </p:cNvPr>
           <p:cNvCxnSpPr>
+            <a:cxnSpLocks/>
             <a:endCxn id="4" idx="0"/>
           </p:cNvCxnSpPr>
           <p:nvPr/>
         </p:nvCxnSpPr>
         <p:spPr>
           <a:xfrm>
-            <a:off x="2847736" y="630355"/>
-            <a:ext cx="0" cy="385010"/>
+            <a:off x="2643404" y="601027"/>
+            <a:ext cx="0" cy="414339"/>
           </a:xfrm>
           <a:prstGeom prst="straightConnector1">
             <a:avLst/>
@@ -4657,12 +5051,516 @@
         </p:nvCxnSpPr>
         <p:spPr>
           <a:xfrm flipV="1">
-            <a:off x="2630676" y="630355"/>
+            <a:off x="2426344" y="622934"/>
             <a:ext cx="217060" cy="1"/>
           </a:xfrm>
           <a:prstGeom prst="line">
             <a:avLst/>
           </a:prstGeom>
+        </p:spPr>
+        <p:style>
+          <a:lnRef idx="1">
+            <a:schemeClr val="accent1"/>
+          </a:lnRef>
+          <a:fillRef idx="0">
+            <a:schemeClr val="accent1"/>
+          </a:fillRef>
+          <a:effectRef idx="0">
+            <a:schemeClr val="accent1"/>
+          </a:effectRef>
+          <a:fontRef idx="minor">
+            <a:schemeClr val="tx1"/>
+          </a:fontRef>
+        </p:style>
+      </p:cxnSp>
+      <p:sp>
+        <p:nvSpPr>
+          <p:cNvPr id="108" name="Rectangle: Rounded Corners 107">
+            <a:extLst>
+              <a:ext uri="{FF2B5EF4-FFF2-40B4-BE49-F238E27FC236}">
+                <a16:creationId xmlns:a16="http://schemas.microsoft.com/office/drawing/2014/main" id="{9F61C4D8-4CD7-3808-0A7E-72C2B7149D09}"/>
+              </a:ext>
+            </a:extLst>
+          </p:cNvPr>
+          <p:cNvSpPr/>
+          <p:nvPr/>
+        </p:nvSpPr>
+        <p:spPr>
+          <a:xfrm>
+            <a:off x="1901988" y="4951266"/>
+            <a:ext cx="1454511" cy="197446"/>
+          </a:xfrm>
+          <a:prstGeom prst="roundRect">
+            <a:avLst/>
+          </a:prstGeom>
+        </p:spPr>
+        <p:style>
+          <a:lnRef idx="2">
+            <a:schemeClr val="accent1">
+              <a:shade val="15000"/>
+            </a:schemeClr>
+          </a:lnRef>
+          <a:fillRef idx="1">
+            <a:schemeClr val="accent1"/>
+          </a:fillRef>
+          <a:effectRef idx="0">
+            <a:schemeClr val="accent1"/>
+          </a:effectRef>
+          <a:fontRef idx="minor">
+            <a:schemeClr val="lt1"/>
+          </a:fontRef>
+        </p:style>
+        <p:txBody>
+          <a:bodyPr rtlCol="0" anchor="ctr"/>
+          <a:lstStyle/>
+          <a:p>
+            <a:pPr algn="ctr"/>
+            <a:r>
+              <a:rPr lang="en-US" sz="1200" dirty="0"/>
+              <a:t>Define Keyboards</a:t>
+            </a:r>
+          </a:p>
+        </p:txBody>
+      </p:sp>
+      <p:sp>
+        <p:nvSpPr>
+          <p:cNvPr id="109" name="TextBox 108">
+            <a:extLst>
+              <a:ext uri="{FF2B5EF4-FFF2-40B4-BE49-F238E27FC236}">
+                <a16:creationId xmlns:a16="http://schemas.microsoft.com/office/drawing/2014/main" id="{AC14E6F8-7329-47A6-2310-B180E0CF8ABF}"/>
+              </a:ext>
+            </a:extLst>
+          </p:cNvPr>
+          <p:cNvSpPr txBox="1"/>
+          <p:nvPr/>
+        </p:nvSpPr>
+        <p:spPr>
+          <a:xfrm>
+            <a:off x="3482340" y="4911489"/>
+            <a:ext cx="4886659" cy="276999"/>
+          </a:xfrm>
+          <a:prstGeom prst="rect">
+            <a:avLst/>
+          </a:prstGeom>
+          <a:noFill/>
+        </p:spPr>
+        <p:txBody>
+          <a:bodyPr wrap="none" rtlCol="0">
+            <a:spAutoFit/>
+          </a:bodyPr>
+          <a:lstStyle/>
+          <a:p>
+            <a:r>
+              <a:rPr lang="en-US" sz="1200" dirty="0"/>
+              <a:t>Read EEPROM and define keyboard for storage track and second comm line</a:t>
+            </a:r>
+          </a:p>
+        </p:txBody>
+      </p:sp>
+      <p:cxnSp>
+        <p:nvCxnSpPr>
+          <p:cNvPr id="110" name="Straight Arrow Connector 109">
+            <a:extLst>
+              <a:ext uri="{FF2B5EF4-FFF2-40B4-BE49-F238E27FC236}">
+                <a16:creationId xmlns:a16="http://schemas.microsoft.com/office/drawing/2014/main" id="{4B34D4F3-2AB3-C7DC-4575-CDDD5BB7D968}"/>
+              </a:ext>
+            </a:extLst>
+          </p:cNvPr>
+          <p:cNvCxnSpPr>
+            <a:cxnSpLocks/>
+            <a:endCxn id="108" idx="0"/>
+          </p:cNvCxnSpPr>
+          <p:nvPr/>
+        </p:nvCxnSpPr>
+        <p:spPr>
+          <a:xfrm flipH="1">
+            <a:off x="2629244" y="4723715"/>
+            <a:ext cx="1" cy="227551"/>
+          </a:xfrm>
+          <a:prstGeom prst="straightConnector1">
+            <a:avLst/>
+          </a:prstGeom>
+          <a:ln>
+            <a:tailEnd type="triangle"/>
+          </a:ln>
+        </p:spPr>
+        <p:style>
+          <a:lnRef idx="1">
+            <a:schemeClr val="accent1"/>
+          </a:lnRef>
+          <a:fillRef idx="0">
+            <a:schemeClr val="accent1"/>
+          </a:fillRef>
+          <a:effectRef idx="0">
+            <a:schemeClr val="accent1"/>
+          </a:effectRef>
+          <a:fontRef idx="minor">
+            <a:schemeClr val="tx1"/>
+          </a:fontRef>
+        </p:style>
+      </p:cxnSp>
+      <p:sp>
+        <p:nvSpPr>
+          <p:cNvPr id="111" name="Rectangle: Rounded Corners 110">
+            <a:extLst>
+              <a:ext uri="{FF2B5EF4-FFF2-40B4-BE49-F238E27FC236}">
+                <a16:creationId xmlns:a16="http://schemas.microsoft.com/office/drawing/2014/main" id="{3687D3D1-F21E-3975-5513-FC0CCC170B71}"/>
+              </a:ext>
+            </a:extLst>
+          </p:cNvPr>
+          <p:cNvSpPr/>
+          <p:nvPr/>
+        </p:nvSpPr>
+        <p:spPr>
+          <a:xfrm>
+            <a:off x="1901988" y="5352586"/>
+            <a:ext cx="1454511" cy="197446"/>
+          </a:xfrm>
+          <a:prstGeom prst="roundRect">
+            <a:avLst/>
+          </a:prstGeom>
+        </p:spPr>
+        <p:style>
+          <a:lnRef idx="2">
+            <a:schemeClr val="accent1">
+              <a:shade val="15000"/>
+            </a:schemeClr>
+          </a:lnRef>
+          <a:fillRef idx="1">
+            <a:schemeClr val="accent1"/>
+          </a:fillRef>
+          <a:effectRef idx="0">
+            <a:schemeClr val="accent1"/>
+          </a:effectRef>
+          <a:fontRef idx="minor">
+            <a:schemeClr val="lt1"/>
+          </a:fontRef>
+        </p:style>
+        <p:txBody>
+          <a:bodyPr rtlCol="0" anchor="ctr"/>
+          <a:lstStyle/>
+          <a:p>
+            <a:pPr algn="ctr"/>
+            <a:r>
+              <a:rPr lang="en-US" sz="1200" dirty="0"/>
+              <a:t>Define Sensors</a:t>
+            </a:r>
+          </a:p>
+        </p:txBody>
+      </p:sp>
+      <p:sp>
+        <p:nvSpPr>
+          <p:cNvPr id="112" name="TextBox 111">
+            <a:extLst>
+              <a:ext uri="{FF2B5EF4-FFF2-40B4-BE49-F238E27FC236}">
+                <a16:creationId xmlns:a16="http://schemas.microsoft.com/office/drawing/2014/main" id="{9F0FBBC9-6EB2-C141-B8AA-D872876F4CC3}"/>
+              </a:ext>
+            </a:extLst>
+          </p:cNvPr>
+          <p:cNvSpPr txBox="1"/>
+          <p:nvPr/>
+        </p:nvSpPr>
+        <p:spPr>
+          <a:xfrm>
+            <a:off x="3482340" y="5312809"/>
+            <a:ext cx="3897414" cy="276999"/>
+          </a:xfrm>
+          <a:prstGeom prst="rect">
+            <a:avLst/>
+          </a:prstGeom>
+          <a:noFill/>
+        </p:spPr>
+        <p:txBody>
+          <a:bodyPr wrap="none" rtlCol="0">
+            <a:spAutoFit/>
+          </a:bodyPr>
+          <a:lstStyle/>
+          <a:p>
+            <a:r>
+              <a:rPr lang="en-US" sz="1200" dirty="0"/>
+              <a:t>Read EEPROM and define sensor boards for block detectors</a:t>
+            </a:r>
+          </a:p>
+        </p:txBody>
+      </p:sp>
+      <p:cxnSp>
+        <p:nvCxnSpPr>
+          <p:cNvPr id="113" name="Straight Arrow Connector 112">
+            <a:extLst>
+              <a:ext uri="{FF2B5EF4-FFF2-40B4-BE49-F238E27FC236}">
+                <a16:creationId xmlns:a16="http://schemas.microsoft.com/office/drawing/2014/main" id="{EC4544CB-B1BD-6B5D-C66C-17BDAB948217}"/>
+              </a:ext>
+            </a:extLst>
+          </p:cNvPr>
+          <p:cNvCxnSpPr>
+            <a:cxnSpLocks/>
+            <a:endCxn id="111" idx="0"/>
+          </p:cNvCxnSpPr>
+          <p:nvPr/>
+        </p:nvCxnSpPr>
+        <p:spPr>
+          <a:xfrm flipH="1">
+            <a:off x="2629244" y="5125035"/>
+            <a:ext cx="1" cy="227551"/>
+          </a:xfrm>
+          <a:prstGeom prst="straightConnector1">
+            <a:avLst/>
+          </a:prstGeom>
+          <a:ln>
+            <a:tailEnd type="triangle"/>
+          </a:ln>
+        </p:spPr>
+        <p:style>
+          <a:lnRef idx="1">
+            <a:schemeClr val="accent1"/>
+          </a:lnRef>
+          <a:fillRef idx="0">
+            <a:schemeClr val="accent1"/>
+          </a:fillRef>
+          <a:effectRef idx="0">
+            <a:schemeClr val="accent1"/>
+          </a:effectRef>
+          <a:fontRef idx="minor">
+            <a:schemeClr val="tx1"/>
+          </a:fontRef>
+        </p:style>
+      </p:cxnSp>
+      <p:sp>
+        <p:nvSpPr>
+          <p:cNvPr id="114" name="Rectangle: Rounded Corners 113">
+            <a:extLst>
+              <a:ext uri="{FF2B5EF4-FFF2-40B4-BE49-F238E27FC236}">
+                <a16:creationId xmlns:a16="http://schemas.microsoft.com/office/drawing/2014/main" id="{1784FF3D-E4E0-AB64-951A-F6BDA31080BC}"/>
+              </a:ext>
+            </a:extLst>
+          </p:cNvPr>
+          <p:cNvSpPr/>
+          <p:nvPr/>
+        </p:nvSpPr>
+        <p:spPr>
+          <a:xfrm>
+            <a:off x="1901988" y="5753906"/>
+            <a:ext cx="1454511" cy="197446"/>
+          </a:xfrm>
+          <a:prstGeom prst="roundRect">
+            <a:avLst/>
+          </a:prstGeom>
+        </p:spPr>
+        <p:style>
+          <a:lnRef idx="2">
+            <a:schemeClr val="accent1">
+              <a:shade val="15000"/>
+            </a:schemeClr>
+          </a:lnRef>
+          <a:fillRef idx="1">
+            <a:schemeClr val="accent1"/>
+          </a:fillRef>
+          <a:effectRef idx="0">
+            <a:schemeClr val="accent1"/>
+          </a:effectRef>
+          <a:fontRef idx="minor">
+            <a:schemeClr val="lt1"/>
+          </a:fontRef>
+        </p:style>
+        <p:txBody>
+          <a:bodyPr rtlCol="0" anchor="ctr"/>
+          <a:lstStyle/>
+          <a:p>
+            <a:pPr algn="ctr"/>
+            <a:r>
+              <a:rPr lang="en-US" sz="1200" dirty="0"/>
+              <a:t>Define Signal Inputs</a:t>
+            </a:r>
+          </a:p>
+        </p:txBody>
+      </p:sp>
+      <p:sp>
+        <p:nvSpPr>
+          <p:cNvPr id="115" name="TextBox 114">
+            <a:extLst>
+              <a:ext uri="{FF2B5EF4-FFF2-40B4-BE49-F238E27FC236}">
+                <a16:creationId xmlns:a16="http://schemas.microsoft.com/office/drawing/2014/main" id="{4C0E903F-E4C6-FEE0-DF99-8D877A4B258A}"/>
+              </a:ext>
+            </a:extLst>
+          </p:cNvPr>
+          <p:cNvSpPr txBox="1"/>
+          <p:nvPr/>
+        </p:nvSpPr>
+        <p:spPr>
+          <a:xfrm>
+            <a:off x="3482340" y="5714129"/>
+            <a:ext cx="4221733" cy="276999"/>
+          </a:xfrm>
+          <a:prstGeom prst="rect">
+            <a:avLst/>
+          </a:prstGeom>
+          <a:noFill/>
+        </p:spPr>
+        <p:txBody>
+          <a:bodyPr wrap="none" rtlCol="0">
+            <a:spAutoFit/>
+          </a:bodyPr>
+          <a:lstStyle/>
+          <a:p>
+            <a:r>
+              <a:rPr lang="en-US" sz="1200" dirty="0"/>
+              <a:t>Read EEPROM and define local and remote inputs for signal logic</a:t>
+            </a:r>
+          </a:p>
+        </p:txBody>
+      </p:sp>
+      <p:cxnSp>
+        <p:nvCxnSpPr>
+          <p:cNvPr id="116" name="Straight Arrow Connector 115">
+            <a:extLst>
+              <a:ext uri="{FF2B5EF4-FFF2-40B4-BE49-F238E27FC236}">
+                <a16:creationId xmlns:a16="http://schemas.microsoft.com/office/drawing/2014/main" id="{367EDA89-8D1A-38E7-BF72-990DA0D84DCD}"/>
+              </a:ext>
+            </a:extLst>
+          </p:cNvPr>
+          <p:cNvCxnSpPr>
+            <a:cxnSpLocks/>
+            <a:endCxn id="114" idx="0"/>
+          </p:cNvCxnSpPr>
+          <p:nvPr/>
+        </p:nvCxnSpPr>
+        <p:spPr>
+          <a:xfrm flipH="1">
+            <a:off x="2629244" y="5526355"/>
+            <a:ext cx="1" cy="227551"/>
+          </a:xfrm>
+          <a:prstGeom prst="straightConnector1">
+            <a:avLst/>
+          </a:prstGeom>
+          <a:ln>
+            <a:tailEnd type="triangle"/>
+          </a:ln>
+        </p:spPr>
+        <p:style>
+          <a:lnRef idx="1">
+            <a:schemeClr val="accent1"/>
+          </a:lnRef>
+          <a:fillRef idx="0">
+            <a:schemeClr val="accent1"/>
+          </a:fillRef>
+          <a:effectRef idx="0">
+            <a:schemeClr val="accent1"/>
+          </a:effectRef>
+          <a:fontRef idx="minor">
+            <a:schemeClr val="tx1"/>
+          </a:fontRef>
+        </p:style>
+      </p:cxnSp>
+      <p:sp>
+        <p:nvSpPr>
+          <p:cNvPr id="117" name="Rectangle: Rounded Corners 116">
+            <a:extLst>
+              <a:ext uri="{FF2B5EF4-FFF2-40B4-BE49-F238E27FC236}">
+                <a16:creationId xmlns:a16="http://schemas.microsoft.com/office/drawing/2014/main" id="{D8C6DF41-399A-9DF3-1793-15C972DBD912}"/>
+              </a:ext>
+            </a:extLst>
+          </p:cNvPr>
+          <p:cNvSpPr/>
+          <p:nvPr/>
+        </p:nvSpPr>
+        <p:spPr>
+          <a:xfrm>
+            <a:off x="1901988" y="6155226"/>
+            <a:ext cx="1454511" cy="197446"/>
+          </a:xfrm>
+          <a:prstGeom prst="roundRect">
+            <a:avLst/>
+          </a:prstGeom>
+        </p:spPr>
+        <p:style>
+          <a:lnRef idx="2">
+            <a:schemeClr val="accent1">
+              <a:shade val="15000"/>
+            </a:schemeClr>
+          </a:lnRef>
+          <a:fillRef idx="1">
+            <a:schemeClr val="accent1"/>
+          </a:fillRef>
+          <a:effectRef idx="0">
+            <a:schemeClr val="accent1"/>
+          </a:effectRef>
+          <a:fontRef idx="minor">
+            <a:schemeClr val="lt1"/>
+          </a:fontRef>
+        </p:style>
+        <p:txBody>
+          <a:bodyPr rtlCol="0" anchor="ctr"/>
+          <a:lstStyle/>
+          <a:p>
+            <a:pPr algn="ctr"/>
+            <a:r>
+              <a:rPr lang="en-US" sz="1200" dirty="0"/>
+              <a:t>Define Signals</a:t>
+            </a:r>
+          </a:p>
+        </p:txBody>
+      </p:sp>
+      <p:sp>
+        <p:nvSpPr>
+          <p:cNvPr id="118" name="TextBox 117">
+            <a:extLst>
+              <a:ext uri="{FF2B5EF4-FFF2-40B4-BE49-F238E27FC236}">
+                <a16:creationId xmlns:a16="http://schemas.microsoft.com/office/drawing/2014/main" id="{6675D6E3-DC1B-BD1C-E577-DD7478BDCA76}"/>
+              </a:ext>
+            </a:extLst>
+          </p:cNvPr>
+          <p:cNvSpPr txBox="1"/>
+          <p:nvPr/>
+        </p:nvSpPr>
+        <p:spPr>
+          <a:xfrm>
+            <a:off x="3482340" y="6115449"/>
+            <a:ext cx="3093539" cy="276999"/>
+          </a:xfrm>
+          <a:prstGeom prst="rect">
+            <a:avLst/>
+          </a:prstGeom>
+          <a:noFill/>
+        </p:spPr>
+        <p:txBody>
+          <a:bodyPr wrap="none" rtlCol="0">
+            <a:spAutoFit/>
+          </a:bodyPr>
+          <a:lstStyle/>
+          <a:p>
+            <a:r>
+              <a:rPr lang="en-US" sz="1200" dirty="0"/>
+              <a:t>Read EEPROM and define signals on the layout</a:t>
+            </a:r>
+          </a:p>
+        </p:txBody>
+      </p:sp>
+      <p:cxnSp>
+        <p:nvCxnSpPr>
+          <p:cNvPr id="119" name="Straight Arrow Connector 118">
+            <a:extLst>
+              <a:ext uri="{FF2B5EF4-FFF2-40B4-BE49-F238E27FC236}">
+                <a16:creationId xmlns:a16="http://schemas.microsoft.com/office/drawing/2014/main" id="{61404695-EA98-C564-535D-718AA27A4469}"/>
+              </a:ext>
+            </a:extLst>
+          </p:cNvPr>
+          <p:cNvCxnSpPr>
+            <a:cxnSpLocks/>
+            <a:endCxn id="117" idx="0"/>
+          </p:cNvCxnSpPr>
+          <p:nvPr/>
+        </p:nvCxnSpPr>
+        <p:spPr>
+          <a:xfrm flipH="1">
+            <a:off x="2629244" y="5927675"/>
+            <a:ext cx="1" cy="227551"/>
+          </a:xfrm>
+          <a:prstGeom prst="straightConnector1">
+            <a:avLst/>
+          </a:prstGeom>
+          <a:ln>
+            <a:tailEnd type="triangle"/>
+          </a:ln>
         </p:spPr>
         <p:style>
           <a:lnRef idx="1">

</xml_diff>